<commit_message>
Updated project and content plan
</commit_message>
<xml_diff>
--- a/_OTHER FILES/Organization/Project Plan/Project Plan.pptx
+++ b/_OTHER FILES/Organization/Project Plan/Project Plan.pptx
@@ -265,7 +265,7 @@
           <a:p>
             <a:fld id="{FF1351A7-0CC0-49EE-969C-7FA0FB4B6599}" type="datetimeFigureOut">
               <a:rPr lang="en-US" smtClean="0"/>
-              <a:t>4/24/2020</a:t>
+              <a:t>5/1/2020</a:t>
             </a:fld>
             <a:endParaRPr lang="en-US"/>
           </a:p>
@@ -465,7 +465,7 @@
           <a:p>
             <a:fld id="{FF1351A7-0CC0-49EE-969C-7FA0FB4B6599}" type="datetimeFigureOut">
               <a:rPr lang="en-US" smtClean="0"/>
-              <a:t>4/24/2020</a:t>
+              <a:t>5/1/2020</a:t>
             </a:fld>
             <a:endParaRPr lang="en-US"/>
           </a:p>
@@ -675,7 +675,7 @@
           <a:p>
             <a:fld id="{FF1351A7-0CC0-49EE-969C-7FA0FB4B6599}" type="datetimeFigureOut">
               <a:rPr lang="en-US" smtClean="0"/>
-              <a:t>4/24/2020</a:t>
+              <a:t>5/1/2020</a:t>
             </a:fld>
             <a:endParaRPr lang="en-US"/>
           </a:p>
@@ -875,7 +875,7 @@
           <a:p>
             <a:fld id="{FF1351A7-0CC0-49EE-969C-7FA0FB4B6599}" type="datetimeFigureOut">
               <a:rPr lang="en-US" smtClean="0"/>
-              <a:t>4/24/2020</a:t>
+              <a:t>5/1/2020</a:t>
             </a:fld>
             <a:endParaRPr lang="en-US"/>
           </a:p>
@@ -1151,7 +1151,7 @@
           <a:p>
             <a:fld id="{FF1351A7-0CC0-49EE-969C-7FA0FB4B6599}" type="datetimeFigureOut">
               <a:rPr lang="en-US" smtClean="0"/>
-              <a:t>4/24/2020</a:t>
+              <a:t>5/1/2020</a:t>
             </a:fld>
             <a:endParaRPr lang="en-US"/>
           </a:p>
@@ -1419,7 +1419,7 @@
           <a:p>
             <a:fld id="{FF1351A7-0CC0-49EE-969C-7FA0FB4B6599}" type="datetimeFigureOut">
               <a:rPr lang="en-US" smtClean="0"/>
-              <a:t>4/24/2020</a:t>
+              <a:t>5/1/2020</a:t>
             </a:fld>
             <a:endParaRPr lang="en-US"/>
           </a:p>
@@ -1834,7 +1834,7 @@
           <a:p>
             <a:fld id="{FF1351A7-0CC0-49EE-969C-7FA0FB4B6599}" type="datetimeFigureOut">
               <a:rPr lang="en-US" smtClean="0"/>
-              <a:t>4/24/2020</a:t>
+              <a:t>5/1/2020</a:t>
             </a:fld>
             <a:endParaRPr lang="en-US"/>
           </a:p>
@@ -1976,7 +1976,7 @@
           <a:p>
             <a:fld id="{FF1351A7-0CC0-49EE-969C-7FA0FB4B6599}" type="datetimeFigureOut">
               <a:rPr lang="en-US" smtClean="0"/>
-              <a:t>4/24/2020</a:t>
+              <a:t>5/1/2020</a:t>
             </a:fld>
             <a:endParaRPr lang="en-US"/>
           </a:p>
@@ -2089,7 +2089,7 @@
           <a:p>
             <a:fld id="{FF1351A7-0CC0-49EE-969C-7FA0FB4B6599}" type="datetimeFigureOut">
               <a:rPr lang="en-US" smtClean="0"/>
-              <a:t>4/24/2020</a:t>
+              <a:t>5/1/2020</a:t>
             </a:fld>
             <a:endParaRPr lang="en-US"/>
           </a:p>
@@ -2402,7 +2402,7 @@
           <a:p>
             <a:fld id="{FF1351A7-0CC0-49EE-969C-7FA0FB4B6599}" type="datetimeFigureOut">
               <a:rPr lang="en-US" smtClean="0"/>
-              <a:t>4/24/2020</a:t>
+              <a:t>5/1/2020</a:t>
             </a:fld>
             <a:endParaRPr lang="en-US"/>
           </a:p>
@@ -2691,7 +2691,7 @@
           <a:p>
             <a:fld id="{FF1351A7-0CC0-49EE-969C-7FA0FB4B6599}" type="datetimeFigureOut">
               <a:rPr lang="en-US" smtClean="0"/>
-              <a:t>4/24/2020</a:t>
+              <a:t>5/1/2020</a:t>
             </a:fld>
             <a:endParaRPr lang="en-US"/>
           </a:p>
@@ -2934,7 +2934,7 @@
           <a:p>
             <a:fld id="{FF1351A7-0CC0-49EE-969C-7FA0FB4B6599}" type="datetimeFigureOut">
               <a:rPr lang="en-US" smtClean="0"/>
-              <a:t>4/24/2020</a:t>
+              <a:t>5/1/2020</a:t>
             </a:fld>
             <a:endParaRPr lang="en-US"/>
           </a:p>
@@ -3467,7 +3467,7 @@
                   </a:schemeClr>
                 </a:solidFill>
               </a:rPr>
-              <a:t>1/3</a:t>
+              <a:t>1/5</a:t>
             </a:r>
           </a:p>
         </p:txBody>
@@ -3551,7 +3551,7 @@
             </a:pPr>
             <a:r>
               <a:rPr lang="en-US" sz="2800" dirty="0"/>
-              <a:t>3 stages + 1 polish sprint</a:t>
+              <a:t>3 development stages</a:t>
             </a:r>
           </a:p>
           <a:p>
@@ -3818,7 +3818,7 @@
                   </a:schemeClr>
                 </a:solidFill>
               </a:rPr>
-              <a:t>2/3</a:t>
+              <a:t>2/5</a:t>
             </a:r>
           </a:p>
         </p:txBody>
@@ -9314,113 +9314,6 @@
           </p:sp>
         </p:grpSp>
       </p:grpSp>
-      <p:sp>
-        <p:nvSpPr>
-          <p:cNvPr id="67" name="Textfeld 66">
-            <a:extLst>
-              <a:ext uri="{FF2B5EF4-FFF2-40B4-BE49-F238E27FC236}">
-                <a16:creationId xmlns:a16="http://schemas.microsoft.com/office/drawing/2014/main" id="{8CA154C1-2285-4E3A-8B24-9D53E967ABDC}"/>
-              </a:ext>
-            </a:extLst>
-          </p:cNvPr>
-          <p:cNvSpPr txBox="1"/>
-          <p:nvPr/>
-        </p:nvSpPr>
-        <p:spPr>
-          <a:xfrm>
-            <a:off x="5609655" y="4873673"/>
-            <a:ext cx="615205" cy="369332"/>
-          </a:xfrm>
-          <a:prstGeom prst="rect">
-            <a:avLst/>
-          </a:prstGeom>
-          <a:noFill/>
-        </p:spPr>
-        <p:txBody>
-          <a:bodyPr wrap="square" rtlCol="0">
-            <a:spAutoFit/>
-          </a:bodyPr>
-          <a:lstStyle/>
-          <a:p>
-            <a:pPr algn="ctr"/>
-            <a:r>
-              <a:rPr lang="en-US" dirty="0">
-                <a:solidFill>
-                  <a:schemeClr val="bg1"/>
-                </a:solidFill>
-                <a:effectLst>
-                  <a:outerShdw blurRad="50800" dist="38100" dir="2700000" algn="tl" rotWithShape="0">
-                    <a:prstClr val="black">
-                      <a:alpha val="40000"/>
-                    </a:prstClr>
-                  </a:outerShdw>
-                </a:effectLst>
-                <a:latin typeface="Arial Black" panose="020B0A04020102020204" pitchFamily="34" charset="0"/>
-              </a:rPr>
-              <a:t>QA</a:t>
-            </a:r>
-          </a:p>
-        </p:txBody>
-      </p:sp>
-      <p:sp>
-        <p:nvSpPr>
-          <p:cNvPr id="68" name="Rechteck: abgerundete Ecken 67">
-            <a:extLst>
-              <a:ext uri="{FF2B5EF4-FFF2-40B4-BE49-F238E27FC236}">
-                <a16:creationId xmlns:a16="http://schemas.microsoft.com/office/drawing/2014/main" id="{A65BAD1F-1082-43C2-B5DB-48C6F4A7DBC2}"/>
-              </a:ext>
-            </a:extLst>
-          </p:cNvPr>
-          <p:cNvSpPr/>
-          <p:nvPr/>
-        </p:nvSpPr>
-        <p:spPr>
-          <a:xfrm>
-            <a:off x="5627939" y="4839658"/>
-            <a:ext cx="589302" cy="412775"/>
-          </a:xfrm>
-          <a:prstGeom prst="roundRect">
-            <a:avLst/>
-          </a:prstGeom>
-          <a:noFill/>
-          <a:ln w="28575">
-            <a:solidFill>
-              <a:schemeClr val="bg1"/>
-            </a:solidFill>
-          </a:ln>
-          <a:effectLst>
-            <a:outerShdw blurRad="50800" dist="38100" dir="2700000" algn="tl" rotWithShape="0">
-              <a:prstClr val="black">
-                <a:alpha val="40000"/>
-              </a:prstClr>
-            </a:outerShdw>
-          </a:effectLst>
-        </p:spPr>
-        <p:style>
-          <a:lnRef idx="2">
-            <a:schemeClr val="accent1">
-              <a:shade val="50000"/>
-            </a:schemeClr>
-          </a:lnRef>
-          <a:fillRef idx="1">
-            <a:schemeClr val="accent1"/>
-          </a:fillRef>
-          <a:effectRef idx="0">
-            <a:schemeClr val="accent1"/>
-          </a:effectRef>
-          <a:fontRef idx="minor">
-            <a:schemeClr val="lt1"/>
-          </a:fontRef>
-        </p:style>
-        <p:txBody>
-          <a:bodyPr rtlCol="0" anchor="ctr"/>
-          <a:lstStyle/>
-          <a:p>
-            <a:pPr algn="ctr"/>
-            <a:endParaRPr lang="en-US"/>
-          </a:p>
-        </p:txBody>
-      </p:sp>
     </p:spTree>
     <p:extLst>
       <p:ext uri="{BB962C8B-B14F-4D97-AF65-F5344CB8AC3E}">
@@ -9567,7 +9460,7 @@
                   </a:schemeClr>
                 </a:solidFill>
               </a:rPr>
-              <a:t>3/3</a:t>
+              <a:t>3/5</a:t>
             </a:r>
           </a:p>
         </p:txBody>
@@ -9586,10 +9479,10 @@
         </p:nvGrpSpPr>
         <p:grpSpPr>
           <a:xfrm>
-            <a:off x="585760" y="1231200"/>
-            <a:ext cx="10624287" cy="4200400"/>
-            <a:chOff x="582013" y="1413769"/>
-            <a:chExt cx="10624287" cy="4200400"/>
+            <a:off x="631254" y="1231200"/>
+            <a:ext cx="10578793" cy="4200400"/>
+            <a:chOff x="627507" y="1413769"/>
+            <a:chExt cx="10578793" cy="4200400"/>
           </a:xfrm>
         </p:grpSpPr>
         <p:graphicFrame>
@@ -12772,61 +12665,6 @@
         </p:sp>
         <p:sp>
           <p:nvSpPr>
-            <p:cNvPr id="32" name="Rechteck 31">
-              <a:extLst>
-                <a:ext uri="{FF2B5EF4-FFF2-40B4-BE49-F238E27FC236}">
-                  <a16:creationId xmlns:a16="http://schemas.microsoft.com/office/drawing/2014/main" id="{E9022A7D-1528-4816-ADF3-56B407F778A9}"/>
-                </a:ext>
-              </a:extLst>
-            </p:cNvPr>
-            <p:cNvSpPr/>
-            <p:nvPr/>
-          </p:nvSpPr>
-          <p:spPr>
-            <a:xfrm>
-              <a:off x="633376" y="4075200"/>
-              <a:ext cx="309039" cy="767027"/>
-            </a:xfrm>
-            <a:prstGeom prst="rect">
-              <a:avLst/>
-            </a:prstGeom>
-            <a:solidFill>
-              <a:schemeClr val="accent1">
-                <a:lumMod val="75000"/>
-                <a:alpha val="50000"/>
-              </a:schemeClr>
-            </a:solidFill>
-            <a:ln>
-              <a:noFill/>
-            </a:ln>
-          </p:spPr>
-          <p:style>
-            <a:lnRef idx="2">
-              <a:schemeClr val="accent1">
-                <a:shade val="50000"/>
-              </a:schemeClr>
-            </a:lnRef>
-            <a:fillRef idx="1">
-              <a:schemeClr val="accent1"/>
-            </a:fillRef>
-            <a:effectRef idx="0">
-              <a:schemeClr val="accent1"/>
-            </a:effectRef>
-            <a:fontRef idx="minor">
-              <a:schemeClr val="lt1"/>
-            </a:fontRef>
-          </p:style>
-          <p:txBody>
-            <a:bodyPr rtlCol="0" anchor="ctr"/>
-            <a:lstStyle/>
-            <a:p>
-              <a:pPr algn="ctr"/>
-              <a:endParaRPr lang="en-US" dirty="0"/>
-            </a:p>
-          </p:txBody>
-        </p:sp>
-        <p:sp>
-          <p:nvSpPr>
             <p:cNvPr id="33" name="Textfeld 32">
               <a:extLst>
                 <a:ext uri="{FF2B5EF4-FFF2-40B4-BE49-F238E27FC236}">
@@ -12935,7 +12773,7 @@
           </p:nvSpPr>
           <p:spPr>
             <a:xfrm>
-              <a:off x="582013" y="4471166"/>
+              <a:off x="2107655" y="4471166"/>
               <a:ext cx="369867" cy="369332"/>
             </a:xfrm>
             <a:prstGeom prst="rect">
@@ -14276,6 +14114,220 @@
           </p:sp>
         </p:grpSp>
       </p:grpSp>
+      <p:sp>
+        <p:nvSpPr>
+          <p:cNvPr id="48" name="Textfeld 47">
+            <a:extLst>
+              <a:ext uri="{FF2B5EF4-FFF2-40B4-BE49-F238E27FC236}">
+                <a16:creationId xmlns:a16="http://schemas.microsoft.com/office/drawing/2014/main" id="{5A65FFA3-6614-41A1-B9ED-E6F0C8CBB445}"/>
+              </a:ext>
+            </a:extLst>
+          </p:cNvPr>
+          <p:cNvSpPr txBox="1"/>
+          <p:nvPr/>
+        </p:nvSpPr>
+        <p:spPr>
+          <a:xfrm>
+            <a:off x="7121410" y="1783131"/>
+            <a:ext cx="615205" cy="369332"/>
+          </a:xfrm>
+          <a:prstGeom prst="rect">
+            <a:avLst/>
+          </a:prstGeom>
+          <a:noFill/>
+        </p:spPr>
+        <p:txBody>
+          <a:bodyPr wrap="square" rtlCol="0">
+            <a:spAutoFit/>
+          </a:bodyPr>
+          <a:lstStyle/>
+          <a:p>
+            <a:pPr algn="ctr"/>
+            <a:r>
+              <a:rPr lang="en-US" dirty="0">
+                <a:solidFill>
+                  <a:schemeClr val="bg1"/>
+                </a:solidFill>
+                <a:effectLst>
+                  <a:outerShdw blurRad="50800" dist="38100" dir="2700000" algn="tl" rotWithShape="0">
+                    <a:prstClr val="black">
+                      <a:alpha val="40000"/>
+                    </a:prstClr>
+                  </a:outerShdw>
+                </a:effectLst>
+                <a:latin typeface="Arial Black" panose="020B0A04020102020204" pitchFamily="34" charset="0"/>
+              </a:rPr>
+              <a:t>QA</a:t>
+            </a:r>
+          </a:p>
+        </p:txBody>
+      </p:sp>
+      <p:sp>
+        <p:nvSpPr>
+          <p:cNvPr id="49" name="Rechteck: abgerundete Ecken 48">
+            <a:extLst>
+              <a:ext uri="{FF2B5EF4-FFF2-40B4-BE49-F238E27FC236}">
+                <a16:creationId xmlns:a16="http://schemas.microsoft.com/office/drawing/2014/main" id="{F486273B-B98A-4A9A-901B-FBA4CCDCDC3E}"/>
+              </a:ext>
+            </a:extLst>
+          </p:cNvPr>
+          <p:cNvSpPr/>
+          <p:nvPr/>
+        </p:nvSpPr>
+        <p:spPr>
+          <a:xfrm>
+            <a:off x="7139694" y="1749116"/>
+            <a:ext cx="589302" cy="412775"/>
+          </a:xfrm>
+          <a:prstGeom prst="roundRect">
+            <a:avLst/>
+          </a:prstGeom>
+          <a:noFill/>
+          <a:ln w="28575">
+            <a:solidFill>
+              <a:schemeClr val="bg1"/>
+            </a:solidFill>
+          </a:ln>
+          <a:effectLst>
+            <a:outerShdw blurRad="50800" dist="38100" dir="2700000" algn="tl" rotWithShape="0">
+              <a:prstClr val="black">
+                <a:alpha val="40000"/>
+              </a:prstClr>
+            </a:outerShdw>
+          </a:effectLst>
+        </p:spPr>
+        <p:style>
+          <a:lnRef idx="2">
+            <a:schemeClr val="accent1">
+              <a:shade val="50000"/>
+            </a:schemeClr>
+          </a:lnRef>
+          <a:fillRef idx="1">
+            <a:schemeClr val="accent1"/>
+          </a:fillRef>
+          <a:effectRef idx="0">
+            <a:schemeClr val="accent1"/>
+          </a:effectRef>
+          <a:fontRef idx="minor">
+            <a:schemeClr val="lt1"/>
+          </a:fontRef>
+        </p:style>
+        <p:txBody>
+          <a:bodyPr rtlCol="0" anchor="ctr"/>
+          <a:lstStyle/>
+          <a:p>
+            <a:pPr algn="ctr"/>
+            <a:endParaRPr lang="en-US"/>
+          </a:p>
+        </p:txBody>
+      </p:sp>
+      <p:sp>
+        <p:nvSpPr>
+          <p:cNvPr id="50" name="Textfeld 49">
+            <a:extLst>
+              <a:ext uri="{FF2B5EF4-FFF2-40B4-BE49-F238E27FC236}">
+                <a16:creationId xmlns:a16="http://schemas.microsoft.com/office/drawing/2014/main" id="{22330A9D-6409-40AA-BB1A-0560BC52A219}"/>
+              </a:ext>
+            </a:extLst>
+          </p:cNvPr>
+          <p:cNvSpPr txBox="1"/>
+          <p:nvPr/>
+        </p:nvSpPr>
+        <p:spPr>
+          <a:xfrm>
+            <a:off x="4082179" y="2553786"/>
+            <a:ext cx="615205" cy="369332"/>
+          </a:xfrm>
+          <a:prstGeom prst="rect">
+            <a:avLst/>
+          </a:prstGeom>
+          <a:noFill/>
+        </p:spPr>
+        <p:txBody>
+          <a:bodyPr wrap="square" rtlCol="0">
+            <a:spAutoFit/>
+          </a:bodyPr>
+          <a:lstStyle/>
+          <a:p>
+            <a:pPr algn="ctr"/>
+            <a:r>
+              <a:rPr lang="en-US" dirty="0">
+                <a:solidFill>
+                  <a:schemeClr val="bg1"/>
+                </a:solidFill>
+                <a:effectLst>
+                  <a:outerShdw blurRad="50800" dist="38100" dir="2700000" algn="tl" rotWithShape="0">
+                    <a:prstClr val="black">
+                      <a:alpha val="40000"/>
+                    </a:prstClr>
+                  </a:outerShdw>
+                </a:effectLst>
+                <a:latin typeface="Arial Black" panose="020B0A04020102020204" pitchFamily="34" charset="0"/>
+              </a:rPr>
+              <a:t>QA</a:t>
+            </a:r>
+          </a:p>
+        </p:txBody>
+      </p:sp>
+      <p:sp>
+        <p:nvSpPr>
+          <p:cNvPr id="51" name="Rechteck: abgerundete Ecken 50">
+            <a:extLst>
+              <a:ext uri="{FF2B5EF4-FFF2-40B4-BE49-F238E27FC236}">
+                <a16:creationId xmlns:a16="http://schemas.microsoft.com/office/drawing/2014/main" id="{FE90C91C-AF9E-4349-B45B-B654B5BA3E4C}"/>
+              </a:ext>
+            </a:extLst>
+          </p:cNvPr>
+          <p:cNvSpPr/>
+          <p:nvPr/>
+        </p:nvSpPr>
+        <p:spPr>
+          <a:xfrm>
+            <a:off x="4100463" y="2519771"/>
+            <a:ext cx="589302" cy="412775"/>
+          </a:xfrm>
+          <a:prstGeom prst="roundRect">
+            <a:avLst/>
+          </a:prstGeom>
+          <a:noFill/>
+          <a:ln w="28575">
+            <a:solidFill>
+              <a:schemeClr val="bg1"/>
+            </a:solidFill>
+          </a:ln>
+          <a:effectLst>
+            <a:outerShdw blurRad="50800" dist="38100" dir="2700000" algn="tl" rotWithShape="0">
+              <a:prstClr val="black">
+                <a:alpha val="40000"/>
+              </a:prstClr>
+            </a:outerShdw>
+          </a:effectLst>
+        </p:spPr>
+        <p:style>
+          <a:lnRef idx="2">
+            <a:schemeClr val="accent1">
+              <a:shade val="50000"/>
+            </a:schemeClr>
+          </a:lnRef>
+          <a:fillRef idx="1">
+            <a:schemeClr val="accent1"/>
+          </a:fillRef>
+          <a:effectRef idx="0">
+            <a:schemeClr val="accent1"/>
+          </a:effectRef>
+          <a:fontRef idx="minor">
+            <a:schemeClr val="lt1"/>
+          </a:fontRef>
+        </p:style>
+        <p:txBody>
+          <a:bodyPr rtlCol="0" anchor="ctr"/>
+          <a:lstStyle/>
+          <a:p>
+            <a:pPr algn="ctr"/>
+            <a:endParaRPr lang="en-US"/>
+          </a:p>
+        </p:txBody>
+      </p:sp>
     </p:spTree>
     <p:extLst>
       <p:ext uri="{BB962C8B-B14F-4D97-AF65-F5344CB8AC3E}">
@@ -14422,7 +14474,7 @@
                   </a:schemeClr>
                 </a:solidFill>
               </a:rPr>
-              <a:t>1/2</a:t>
+              <a:t>4/5</a:t>
             </a:r>
           </a:p>
         </p:txBody>
@@ -17153,7 +17205,7 @@
             <a:avLst/>
           </a:prstGeom>
           <a:solidFill>
-            <a:srgbClr val="002060">
+            <a:srgbClr val="F32993">
               <a:alpha val="50000"/>
             </a:srgbClr>
           </a:solidFill>
@@ -17585,7 +17637,7 @@
             <a:avLst/>
           </a:prstGeom>
           <a:solidFill>
-            <a:srgbClr val="002060">
+            <a:srgbClr val="F32993">
               <a:alpha val="50000"/>
             </a:srgbClr>
           </a:solidFill>
@@ -18173,9 +18225,9 @@
         <p:grpSpPr>
           <a:xfrm>
             <a:off x="626450" y="5530285"/>
-            <a:ext cx="3225237" cy="963138"/>
+            <a:ext cx="3225237" cy="646577"/>
             <a:chOff x="626450" y="5530285"/>
-            <a:chExt cx="3225237" cy="963138"/>
+            <a:chExt cx="3225237" cy="646577"/>
           </a:xfrm>
         </p:grpSpPr>
         <p:sp>
@@ -18284,58 +18336,6 @@
         </p:sp>
         <p:sp>
           <p:nvSpPr>
-            <p:cNvPr id="71" name="Rechteck 70">
-              <a:extLst>
-                <a:ext uri="{FF2B5EF4-FFF2-40B4-BE49-F238E27FC236}">
-                  <a16:creationId xmlns:a16="http://schemas.microsoft.com/office/drawing/2014/main" id="{EFC1A1A0-A5F7-4FC0-9C02-DB2EEDB0D9A3}"/>
-                </a:ext>
-              </a:extLst>
-            </p:cNvPr>
-            <p:cNvSpPr/>
-            <p:nvPr/>
-          </p:nvSpPr>
-          <p:spPr>
-            <a:xfrm>
-              <a:off x="626450" y="6212249"/>
-              <a:ext cx="509475" cy="259490"/>
-            </a:xfrm>
-            <a:prstGeom prst="rect">
-              <a:avLst/>
-            </a:prstGeom>
-            <a:solidFill>
-              <a:srgbClr val="7F8FAF"/>
-            </a:solidFill>
-            <a:ln>
-              <a:noFill/>
-            </a:ln>
-          </p:spPr>
-          <p:style>
-            <a:lnRef idx="2">
-              <a:schemeClr val="accent1">
-                <a:shade val="50000"/>
-              </a:schemeClr>
-            </a:lnRef>
-            <a:fillRef idx="1">
-              <a:schemeClr val="accent1"/>
-            </a:fillRef>
-            <a:effectRef idx="0">
-              <a:schemeClr val="accent1"/>
-            </a:effectRef>
-            <a:fontRef idx="minor">
-              <a:schemeClr val="lt1"/>
-            </a:fontRef>
-          </p:style>
-          <p:txBody>
-            <a:bodyPr rtlCol="0" anchor="ctr"/>
-            <a:lstStyle/>
-            <a:p>
-              <a:pPr algn="ctr"/>
-              <a:endParaRPr lang="en-US"/>
-            </a:p>
-          </p:txBody>
-        </p:sp>
-        <p:sp>
-          <p:nvSpPr>
             <p:cNvPr id="76" name="Textfeld 75">
               <a:extLst>
                 <a:ext uri="{FF2B5EF4-FFF2-40B4-BE49-F238E27FC236}">
@@ -18412,47 +18412,6 @@
                   </a:solidFill>
                 </a:rPr>
                 <a:t>Stage 2</a:t>
-              </a:r>
-            </a:p>
-          </p:txBody>
-        </p:sp>
-        <p:sp>
-          <p:nvSpPr>
-            <p:cNvPr id="78" name="Textfeld 77">
-              <a:extLst>
-                <a:ext uri="{FF2B5EF4-FFF2-40B4-BE49-F238E27FC236}">
-                  <a16:creationId xmlns:a16="http://schemas.microsoft.com/office/drawing/2014/main" id="{94CC2317-46EE-45E7-9130-20AA69A31C42}"/>
-                </a:ext>
-              </a:extLst>
-            </p:cNvPr>
-            <p:cNvSpPr txBox="1"/>
-            <p:nvPr/>
-          </p:nvSpPr>
-          <p:spPr>
-            <a:xfrm>
-              <a:off x="2135922" y="6154869"/>
-              <a:ext cx="1714612" cy="338554"/>
-            </a:xfrm>
-            <a:prstGeom prst="rect">
-              <a:avLst/>
-            </a:prstGeom>
-            <a:noFill/>
-          </p:spPr>
-          <p:txBody>
-            <a:bodyPr wrap="square" rtlCol="0">
-              <a:spAutoFit/>
-            </a:bodyPr>
-            <a:lstStyle/>
-            <a:p>
-              <a:r>
-                <a:rPr lang="en-US" sz="1600" dirty="0">
-                  <a:solidFill>
-                    <a:schemeClr val="bg2">
-                      <a:lumMod val="50000"/>
-                    </a:schemeClr>
-                  </a:solidFill>
-                </a:rPr>
-                <a:t>Stage 3</a:t>
               </a:r>
             </a:p>
           </p:txBody>
@@ -18658,7 +18617,7 @@
                   </a:schemeClr>
                 </a:solidFill>
               </a:rPr>
-              <a:t>2/2</a:t>
+              <a:t>5/5</a:t>
             </a:r>
           </a:p>
         </p:txBody>
@@ -21274,7 +21233,7 @@
             <a:avLst/>
           </a:prstGeom>
           <a:solidFill>
-            <a:srgbClr val="002060">
+            <a:srgbClr val="F32993">
               <a:alpha val="49804"/>
             </a:srgbClr>
           </a:solidFill>
@@ -21436,7 +21395,7 @@
             <a:avLst/>
           </a:prstGeom>
           <a:solidFill>
-            <a:srgbClr val="002060">
+            <a:srgbClr val="F32993">
               <a:alpha val="49804"/>
             </a:srgbClr>
           </a:solidFill>
@@ -21490,7 +21449,7 @@
             <a:avLst/>
           </a:prstGeom>
           <a:solidFill>
-            <a:srgbClr val="002060">
+            <a:srgbClr val="F32993">
               <a:alpha val="49804"/>
             </a:srgbClr>
           </a:solidFill>
@@ -21544,7 +21503,7 @@
             <a:avLst/>
           </a:prstGeom>
           <a:solidFill>
-            <a:srgbClr val="002060">
+            <a:srgbClr val="0BAD92">
               <a:alpha val="49804"/>
             </a:srgbClr>
           </a:solidFill>
@@ -21598,7 +21557,7 @@
             <a:avLst/>
           </a:prstGeom>
           <a:solidFill>
-            <a:srgbClr val="002060">
+            <a:srgbClr val="0BAD92">
               <a:alpha val="49804"/>
             </a:srgbClr>
           </a:solidFill>
@@ -21706,7 +21665,7 @@
             <a:avLst/>
           </a:prstGeom>
           <a:solidFill>
-            <a:srgbClr val="002060">
+            <a:srgbClr val="F32993">
               <a:alpha val="49804"/>
             </a:srgbClr>
           </a:solidFill>
@@ -21760,7 +21719,7 @@
             <a:avLst/>
           </a:prstGeom>
           <a:solidFill>
-            <a:srgbClr val="002060">
+            <a:srgbClr val="F32993">
               <a:alpha val="49804"/>
             </a:srgbClr>
           </a:solidFill>
@@ -21814,7 +21773,7 @@
             <a:avLst/>
           </a:prstGeom>
           <a:solidFill>
-            <a:srgbClr val="002060">
+            <a:srgbClr val="0BAD92">
               <a:alpha val="49804"/>
             </a:srgbClr>
           </a:solidFill>
@@ -21868,7 +21827,7 @@
             <a:avLst/>
           </a:prstGeom>
           <a:solidFill>
-            <a:srgbClr val="002060">
+            <a:srgbClr val="0BAD92">
               <a:alpha val="49804"/>
             </a:srgbClr>
           </a:solidFill>
@@ -21922,7 +21881,7 @@
             <a:avLst/>
           </a:prstGeom>
           <a:solidFill>
-            <a:srgbClr val="002060">
+            <a:srgbClr val="0BAD92">
               <a:alpha val="49804"/>
             </a:srgbClr>
           </a:solidFill>
@@ -21976,7 +21935,7 @@
             <a:avLst/>
           </a:prstGeom>
           <a:solidFill>
-            <a:srgbClr val="002060">
+            <a:srgbClr val="0BAD92">
               <a:alpha val="49804"/>
             </a:srgbClr>
           </a:solidFill>
@@ -22246,7 +22205,7 @@
             <a:avLst/>
           </a:prstGeom>
           <a:solidFill>
-            <a:srgbClr val="002060">
+            <a:srgbClr val="0BAD92">
               <a:alpha val="49804"/>
             </a:srgbClr>
           </a:solidFill>
@@ -22279,213 +22238,192 @@
           </a:p>
         </p:txBody>
       </p:sp>
-      <p:grpSp>
-        <p:nvGrpSpPr>
-          <p:cNvPr id="49" name="Gruppieren 48">
+      <p:sp>
+        <p:nvSpPr>
+          <p:cNvPr id="31" name="Rechteck 30">
             <a:extLst>
               <a:ext uri="{FF2B5EF4-FFF2-40B4-BE49-F238E27FC236}">
-                <a16:creationId xmlns:a16="http://schemas.microsoft.com/office/drawing/2014/main" id="{9EC89DE9-DDA6-46F1-85AD-A3E2BEC6AD69}"/>
+                <a16:creationId xmlns:a16="http://schemas.microsoft.com/office/drawing/2014/main" id="{09E888C4-0E34-4F59-92F2-5DE3D99E84CA}"/>
               </a:ext>
             </a:extLst>
           </p:cNvPr>
-          <p:cNvGrpSpPr/>
+          <p:cNvSpPr/>
           <p:nvPr/>
-        </p:nvGrpSpPr>
-        <p:grpSpPr>
+        </p:nvSpPr>
+        <p:spPr>
           <a:xfrm>
-            <a:off x="626450" y="5530285"/>
-            <a:ext cx="3225237" cy="646577"/>
-            <a:chOff x="626450" y="5530285"/>
-            <a:chExt cx="3225237" cy="646577"/>
+            <a:off x="633878" y="5582518"/>
+            <a:ext cx="509738" cy="259490"/>
           </a:xfrm>
-        </p:grpSpPr>
-        <p:sp>
-          <p:nvSpPr>
-            <p:cNvPr id="50" name="Rechteck 49">
-              <a:extLst>
-                <a:ext uri="{FF2B5EF4-FFF2-40B4-BE49-F238E27FC236}">
-                  <a16:creationId xmlns:a16="http://schemas.microsoft.com/office/drawing/2014/main" id="{284A50DF-8DAE-44D2-8F09-E3D60F2147EA}"/>
-                </a:ext>
-              </a:extLst>
-            </p:cNvPr>
-            <p:cNvSpPr/>
-            <p:nvPr/>
-          </p:nvSpPr>
-          <p:spPr>
-            <a:xfrm>
-              <a:off x="629778" y="5582518"/>
-              <a:ext cx="506410" cy="259489"/>
-            </a:xfrm>
-            <a:prstGeom prst="rect">
-              <a:avLst/>
-            </a:prstGeom>
-            <a:solidFill>
-              <a:srgbClr val="7F8FAF"/>
-            </a:solidFill>
-            <a:ln>
-              <a:noFill/>
-            </a:ln>
-          </p:spPr>
-          <p:style>
-            <a:lnRef idx="2">
-              <a:schemeClr val="accent1">
-                <a:shade val="50000"/>
-              </a:schemeClr>
-            </a:lnRef>
-            <a:fillRef idx="1">
-              <a:schemeClr val="accent1"/>
-            </a:fillRef>
-            <a:effectRef idx="0">
-              <a:schemeClr val="accent1"/>
-            </a:effectRef>
-            <a:fontRef idx="minor">
-              <a:schemeClr val="lt1"/>
-            </a:fontRef>
-          </p:style>
-          <p:txBody>
-            <a:bodyPr rtlCol="0" anchor="ctr"/>
-            <a:lstStyle/>
-            <a:p>
-              <a:pPr algn="ctr"/>
-              <a:endParaRPr lang="en-US"/>
-            </a:p>
-          </p:txBody>
-        </p:sp>
-        <p:sp>
-          <p:nvSpPr>
-            <p:cNvPr id="51" name="Rechteck 50">
-              <a:extLst>
-                <a:ext uri="{FF2B5EF4-FFF2-40B4-BE49-F238E27FC236}">
-                  <a16:creationId xmlns:a16="http://schemas.microsoft.com/office/drawing/2014/main" id="{0B2D3915-DBE1-478E-ACD0-FBC1BBEF9181}"/>
-                </a:ext>
-              </a:extLst>
-            </p:cNvPr>
-            <p:cNvSpPr/>
-            <p:nvPr/>
-          </p:nvSpPr>
-          <p:spPr>
-            <a:xfrm>
-              <a:off x="626450" y="5897383"/>
-              <a:ext cx="509738" cy="259490"/>
-            </a:xfrm>
-            <a:prstGeom prst="rect">
-              <a:avLst/>
-            </a:prstGeom>
-            <a:solidFill>
-              <a:srgbClr val="85D6C9"/>
-            </a:solidFill>
-            <a:ln>
-              <a:noFill/>
-            </a:ln>
-          </p:spPr>
-          <p:style>
-            <a:lnRef idx="2">
-              <a:schemeClr val="accent1">
-                <a:shade val="50000"/>
-              </a:schemeClr>
-            </a:lnRef>
-            <a:fillRef idx="1">
-              <a:schemeClr val="accent1"/>
-            </a:fillRef>
-            <a:effectRef idx="0">
-              <a:schemeClr val="accent1"/>
-            </a:effectRef>
-            <a:fontRef idx="minor">
-              <a:schemeClr val="lt1"/>
-            </a:fontRef>
-          </p:style>
-          <p:txBody>
-            <a:bodyPr rtlCol="0" anchor="ctr"/>
-            <a:lstStyle/>
-            <a:p>
-              <a:pPr algn="ctr"/>
-              <a:endParaRPr lang="en-US"/>
-            </a:p>
-          </p:txBody>
-        </p:sp>
-        <p:sp>
-          <p:nvSpPr>
-            <p:cNvPr id="53" name="Textfeld 52">
-              <a:extLst>
-                <a:ext uri="{FF2B5EF4-FFF2-40B4-BE49-F238E27FC236}">
-                  <a16:creationId xmlns:a16="http://schemas.microsoft.com/office/drawing/2014/main" id="{C1D15F30-B3F0-4E5F-9853-71A0B5CD5B59}"/>
-                </a:ext>
-              </a:extLst>
-            </p:cNvPr>
-            <p:cNvSpPr txBox="1"/>
-            <p:nvPr/>
-          </p:nvSpPr>
-          <p:spPr>
-            <a:xfrm>
-              <a:off x="2137075" y="5530285"/>
-              <a:ext cx="1714612" cy="338554"/>
-            </a:xfrm>
-            <a:prstGeom prst="rect">
-              <a:avLst/>
-            </a:prstGeom>
+          <a:prstGeom prst="rect">
+            <a:avLst/>
+          </a:prstGeom>
+          <a:solidFill>
+            <a:srgbClr val="F994C9"/>
+          </a:solidFill>
+          <a:ln>
             <a:noFill/>
-          </p:spPr>
-          <p:txBody>
-            <a:bodyPr wrap="square" rtlCol="0">
-              <a:spAutoFit/>
-            </a:bodyPr>
-            <a:lstStyle/>
-            <a:p>
-              <a:r>
-                <a:rPr lang="en-US" sz="1600" dirty="0">
-                  <a:solidFill>
-                    <a:schemeClr val="bg2">
-                      <a:lumMod val="50000"/>
-                    </a:schemeClr>
-                  </a:solidFill>
-                </a:rPr>
-                <a:t>Stage 3</a:t>
-              </a:r>
-            </a:p>
-          </p:txBody>
-        </p:sp>
-        <p:sp>
-          <p:nvSpPr>
-            <p:cNvPr id="54" name="Textfeld 53">
-              <a:extLst>
-                <a:ext uri="{FF2B5EF4-FFF2-40B4-BE49-F238E27FC236}">
-                  <a16:creationId xmlns:a16="http://schemas.microsoft.com/office/drawing/2014/main" id="{3FB3DCFE-864A-425D-9592-10B4F4504FFF}"/>
-                </a:ext>
-              </a:extLst>
-            </p:cNvPr>
-            <p:cNvSpPr txBox="1"/>
-            <p:nvPr/>
-          </p:nvSpPr>
-          <p:spPr>
-            <a:xfrm>
-              <a:off x="2137075" y="5838308"/>
-              <a:ext cx="1714612" cy="338554"/>
-            </a:xfrm>
-            <a:prstGeom prst="rect">
-              <a:avLst/>
-            </a:prstGeom>
+          </a:ln>
+        </p:spPr>
+        <p:style>
+          <a:lnRef idx="2">
+            <a:schemeClr val="accent1">
+              <a:shade val="50000"/>
+            </a:schemeClr>
+          </a:lnRef>
+          <a:fillRef idx="1">
+            <a:schemeClr val="accent1"/>
+          </a:fillRef>
+          <a:effectRef idx="0">
+            <a:schemeClr val="accent1"/>
+          </a:effectRef>
+          <a:fontRef idx="minor">
+            <a:schemeClr val="lt1"/>
+          </a:fontRef>
+        </p:style>
+        <p:txBody>
+          <a:bodyPr rtlCol="0" anchor="ctr"/>
+          <a:lstStyle/>
+          <a:p>
+            <a:pPr algn="ctr"/>
+            <a:endParaRPr lang="en-US"/>
+          </a:p>
+        </p:txBody>
+      </p:sp>
+      <p:sp>
+        <p:nvSpPr>
+          <p:cNvPr id="32" name="Textfeld 31">
+            <a:extLst>
+              <a:ext uri="{FF2B5EF4-FFF2-40B4-BE49-F238E27FC236}">
+                <a16:creationId xmlns:a16="http://schemas.microsoft.com/office/drawing/2014/main" id="{E13FF225-245D-4800-B99F-1797704949F3}"/>
+              </a:ext>
+            </a:extLst>
+          </p:cNvPr>
+          <p:cNvSpPr txBox="1"/>
+          <p:nvPr/>
+        </p:nvSpPr>
+        <p:spPr>
+          <a:xfrm>
+            <a:off x="2144503" y="5523443"/>
+            <a:ext cx="1714612" cy="338554"/>
+          </a:xfrm>
+          <a:prstGeom prst="rect">
+            <a:avLst/>
+          </a:prstGeom>
+          <a:noFill/>
+        </p:spPr>
+        <p:txBody>
+          <a:bodyPr wrap="square" rtlCol="0">
+            <a:spAutoFit/>
+          </a:bodyPr>
+          <a:lstStyle/>
+          <a:p>
+            <a:r>
+              <a:rPr lang="en-US" sz="1600" dirty="0">
+                <a:solidFill>
+                  <a:schemeClr val="bg2">
+                    <a:lumMod val="50000"/>
+                  </a:schemeClr>
+                </a:solidFill>
+              </a:rPr>
+              <a:t>Stage 2</a:t>
+            </a:r>
+          </a:p>
+        </p:txBody>
+      </p:sp>
+      <p:sp>
+        <p:nvSpPr>
+          <p:cNvPr id="33" name="Rechteck 32">
+            <a:extLst>
+              <a:ext uri="{FF2B5EF4-FFF2-40B4-BE49-F238E27FC236}">
+                <a16:creationId xmlns:a16="http://schemas.microsoft.com/office/drawing/2014/main" id="{6DC91122-B507-42EB-8DCC-91997E55455D}"/>
+              </a:ext>
+            </a:extLst>
+          </p:cNvPr>
+          <p:cNvSpPr/>
+          <p:nvPr/>
+        </p:nvSpPr>
+        <p:spPr>
+          <a:xfrm>
+            <a:off x="629778" y="5898808"/>
+            <a:ext cx="506410" cy="259489"/>
+          </a:xfrm>
+          <a:prstGeom prst="rect">
+            <a:avLst/>
+          </a:prstGeom>
+          <a:solidFill>
+            <a:srgbClr val="85D6C9"/>
+          </a:solidFill>
+          <a:ln>
             <a:noFill/>
-          </p:spPr>
-          <p:txBody>
-            <a:bodyPr wrap="square" rtlCol="0">
-              <a:spAutoFit/>
-            </a:bodyPr>
-            <a:lstStyle/>
-            <a:p>
-              <a:r>
-                <a:rPr lang="en-US" sz="1600" dirty="0">
-                  <a:solidFill>
-                    <a:schemeClr val="bg2">
-                      <a:lumMod val="50000"/>
-                    </a:schemeClr>
-                  </a:solidFill>
-                </a:rPr>
-                <a:t>Polish</a:t>
-              </a:r>
-            </a:p>
-          </p:txBody>
-        </p:sp>
-      </p:grpSp>
+          </a:ln>
+        </p:spPr>
+        <p:style>
+          <a:lnRef idx="2">
+            <a:schemeClr val="accent1">
+              <a:shade val="50000"/>
+            </a:schemeClr>
+          </a:lnRef>
+          <a:fillRef idx="1">
+            <a:schemeClr val="accent1"/>
+          </a:fillRef>
+          <a:effectRef idx="0">
+            <a:schemeClr val="accent1"/>
+          </a:effectRef>
+          <a:fontRef idx="minor">
+            <a:schemeClr val="lt1"/>
+          </a:fontRef>
+        </p:style>
+        <p:txBody>
+          <a:bodyPr rtlCol="0" anchor="ctr"/>
+          <a:lstStyle/>
+          <a:p>
+            <a:pPr algn="ctr"/>
+            <a:endParaRPr lang="en-US"/>
+          </a:p>
+        </p:txBody>
+      </p:sp>
+      <p:sp>
+        <p:nvSpPr>
+          <p:cNvPr id="34" name="Textfeld 33">
+            <a:extLst>
+              <a:ext uri="{FF2B5EF4-FFF2-40B4-BE49-F238E27FC236}">
+                <a16:creationId xmlns:a16="http://schemas.microsoft.com/office/drawing/2014/main" id="{0C5FE29B-0661-4DFE-BAB6-365330B5347C}"/>
+              </a:ext>
+            </a:extLst>
+          </p:cNvPr>
+          <p:cNvSpPr txBox="1"/>
+          <p:nvPr/>
+        </p:nvSpPr>
+        <p:spPr>
+          <a:xfrm>
+            <a:off x="2137075" y="5846575"/>
+            <a:ext cx="833765" cy="338554"/>
+          </a:xfrm>
+          <a:prstGeom prst="rect">
+            <a:avLst/>
+          </a:prstGeom>
+          <a:noFill/>
+        </p:spPr>
+        <p:txBody>
+          <a:bodyPr wrap="square" rtlCol="0">
+            <a:spAutoFit/>
+          </a:bodyPr>
+          <a:lstStyle/>
+          <a:p>
+            <a:r>
+              <a:rPr lang="en-US" sz="1600" dirty="0">
+                <a:solidFill>
+                  <a:schemeClr val="bg2">
+                    <a:lumMod val="50000"/>
+                  </a:schemeClr>
+                </a:solidFill>
+              </a:rPr>
+              <a:t>Stage 3</a:t>
+            </a:r>
+          </a:p>
+        </p:txBody>
+      </p:sp>
     </p:spTree>
     <p:extLst>
       <p:ext uri="{BB962C8B-B14F-4D97-AF65-F5344CB8AC3E}">

</xml_diff>